<commit_message>
Update the draft for use case of the app
Going to find relationship between the app and Spatial Calculations and photography
</commit_message>
<xml_diff>
--- a/slides for meetings/meeting Feb 19_new.pptx
+++ b/slides for meetings/meeting Feb 19_new.pptx
@@ -4690,8 +4690,8 @@
         </p:nvSpPr>
         <p:spPr>
           <a:xfrm>
-            <a:off x="10307955" y="844550"/>
-            <a:ext cx="2094230" cy="967740"/>
+            <a:off x="8718550" y="462280"/>
+            <a:ext cx="3205480" cy="967740"/>
           </a:xfrm>
           <a:prstGeom prst="rect">
             <a:avLst/>
@@ -4738,7 +4738,7 @@
                   </a:schemeClr>
                 </a:solidFill>
               </a:rPr>
-              <a:t>i</a:t>
+              <a:t>iΘ=cosΘ+i*sin(</a:t>
             </a:r>
             <a:r>
               <a:rPr lang="en-US" altLang="zh-CN" sz="3600" baseline="30000">
@@ -4748,7 +4748,7 @@
                   </a:schemeClr>
                 </a:solidFill>
               </a:rPr>
-              <a:t>Θ</a:t>
+              <a:t>Θ)</a:t>
             </a:r>
             <a:endParaRPr lang="en-US" altLang="zh-CN" sz="3600" baseline="30000">
               <a:solidFill>
@@ -5200,8 +5200,8 @@
         </p:blipFill>
         <p:spPr>
           <a:xfrm>
-            <a:off x="6652260" y="3917315"/>
-            <a:ext cx="4955540" cy="1009650"/>
+            <a:off x="6527800" y="2793365"/>
+            <a:ext cx="4677410" cy="953135"/>
           </a:xfrm>
           <a:prstGeom prst="rect">
             <a:avLst/>
@@ -5218,7 +5218,7 @@
         </p:nvSpPr>
         <p:spPr>
           <a:xfrm>
-            <a:off x="6350000" y="1065530"/>
+            <a:off x="6350000" y="580390"/>
             <a:ext cx="3672205" cy="1450340"/>
           </a:xfrm>
           <a:prstGeom prst="rect">
@@ -5289,7 +5289,7 @@
         </p:nvSpPr>
         <p:spPr>
           <a:xfrm>
-            <a:off x="6805930" y="2779395"/>
+            <a:off x="6805930" y="1899285"/>
             <a:ext cx="4398645" cy="1450340"/>
           </a:xfrm>
           <a:prstGeom prst="rect">
@@ -5360,7 +5360,7 @@
         </p:nvSpPr>
         <p:spPr>
           <a:xfrm>
-            <a:off x="10241280" y="1065530"/>
+            <a:off x="9973945" y="527050"/>
             <a:ext cx="2094230" cy="967740"/>
           </a:xfrm>
           <a:prstGeom prst="rect">
@@ -5438,7 +5438,7 @@
         </p:nvGrpSpPr>
         <p:grpSpPr>
           <a:xfrm>
-            <a:off x="6144260" y="1903095"/>
+            <a:off x="6096635" y="1431290"/>
             <a:ext cx="5971540" cy="876300"/>
             <a:chOff x="7493" y="3740"/>
             <a:chExt cx="9404" cy="1380"/>
@@ -5533,6 +5533,30 @@
           </a:prstGeom>
         </p:spPr>
       </p:pic>
+      <p:pic>
+        <p:nvPicPr>
+          <p:cNvPr id="4" name="图片 3"/>
+          <p:cNvPicPr>
+            <a:picLocks noChangeAspect="1"/>
+          </p:cNvPicPr>
+          <p:nvPr/>
+        </p:nvPicPr>
+        <p:blipFill>
+          <a:blip r:embed="rId4"/>
+          <a:stretch>
+            <a:fillRect/>
+          </a:stretch>
+        </p:blipFill>
+        <p:spPr>
+          <a:xfrm>
+            <a:off x="7174230" y="3803015"/>
+            <a:ext cx="3533775" cy="3007360"/>
+          </a:xfrm>
+          <a:prstGeom prst="rect">
+            <a:avLst/>
+          </a:prstGeom>
+        </p:spPr>
+      </p:pic>
     </p:spTree>
   </p:cSld>
   <p:clrMapOvr>
@@ -6374,7 +6398,7 @@
         </p:nvSpPr>
         <p:spPr>
           <a:xfrm>
-            <a:off x="295910" y="779145"/>
+            <a:off x="231775" y="1247140"/>
             <a:ext cx="11400790" cy="5452110"/>
           </a:xfrm>
           <a:prstGeom prst="rect">
@@ -6504,6 +6528,16 @@
           </a:p>
           <a:p>
             <a:pPr algn="l"/>
+            <a:r>
+              <a:rPr lang="en-US" altLang="zh-CN" sz="2800">
+                <a:solidFill>
+                  <a:schemeClr val="bg1">
+                    <a:lumMod val="95000"/>
+                  </a:schemeClr>
+                </a:solidFill>
+              </a:rPr>
+              <a:t>What I have tried to solve the task:</a:t>
+            </a:r>
             <a:endParaRPr lang="en-US" altLang="zh-CN" sz="2800">
               <a:solidFill>
                 <a:schemeClr val="bg1">
@@ -6522,18 +6556,8 @@
                   </a:schemeClr>
                 </a:solidFill>
               </a:rPr>
-              <a:t>What I have tried to solve the task:</a:t>
-            </a:r>
-            <a:endParaRPr lang="en-US" altLang="zh-CN" sz="2800">
-              <a:solidFill>
-                <a:schemeClr val="bg1">
-                  <a:lumMod val="95000"/>
-                </a:schemeClr>
-              </a:solidFill>
-            </a:endParaRPr>
-          </a:p>
-          <a:p>
-            <a:pPr algn="l"/>
+              <a:t>1. Compute shader + </a:t>
+            </a:r>
             <a:r>
               <a:rPr lang="en-US" altLang="zh-CN" sz="2800">
                 <a:solidFill>
@@ -6541,8 +6565,19 @@
                     <a:lumMod val="95000"/>
                   </a:schemeClr>
                 </a:solidFill>
+                <a:sym typeface="+mn-ea"/>
               </a:rPr>
-              <a:t>1. Compute shader + 3D texture for a material(calcualte double integral on each voxels, failed)</a:t>
+              <a:t>Controller.cs  to generate </a:t>
+            </a:r>
+            <a:r>
+              <a:rPr lang="en-US" altLang="zh-CN" sz="2800">
+                <a:solidFill>
+                  <a:schemeClr val="bg1">
+                    <a:lumMod val="95000"/>
+                  </a:schemeClr>
+                </a:solidFill>
+              </a:rPr>
+              <a:t>3D texture for a material + (calculate double integral on each voxels, failed, 3D texture generated failed in inspector without error)</a:t>
             </a:r>
             <a:endParaRPr lang="en-US" altLang="zh-CN" sz="2800">
               <a:solidFill>
@@ -6573,6 +6608,26 @@
                 </a:solidFill>
               </a:rPr>
               <a:t>2. Some other tries on the rendering of material and texture and so on</a:t>
+            </a:r>
+            <a:endParaRPr lang="en-US" altLang="zh-CN" sz="2800">
+              <a:solidFill>
+                <a:schemeClr val="bg1">
+                  <a:lumMod val="95000"/>
+                </a:schemeClr>
+              </a:solidFill>
+            </a:endParaRPr>
+          </a:p>
+          <a:p>
+            <a:pPr algn="l"/>
+            <a:r>
+              <a:rPr lang="en-US" altLang="zh-CN" sz="2800">
+                <a:solidFill>
+                  <a:schemeClr val="bg1">
+                    <a:lumMod val="95000"/>
+                  </a:schemeClr>
+                </a:solidFill>
+              </a:rPr>
+              <a:t>3. VR streaming problem with my laptop, worked 1 year ago, but now still dark screen after 1 time of driver update</a:t>
             </a:r>
             <a:endParaRPr lang="en-US" altLang="zh-CN" sz="2800">
               <a:solidFill>
@@ -6650,8 +6705,8 @@
         </p:blipFill>
         <p:spPr>
           <a:xfrm>
-            <a:off x="7290435" y="3195955"/>
-            <a:ext cx="3656965" cy="1405890"/>
+            <a:off x="8615680" y="2554605"/>
+            <a:ext cx="3319145" cy="1276350"/>
           </a:xfrm>
           <a:prstGeom prst="rect">
             <a:avLst/>
@@ -7067,6 +7122,94 @@
           </a:prstGeom>
         </p:spPr>
       </p:pic>
+      <p:cxnSp>
+        <p:nvCxnSpPr>
+          <p:cNvPr id="8" name="直接连接符 7"/>
+          <p:cNvCxnSpPr/>
+          <p:nvPr/>
+        </p:nvCxnSpPr>
+        <p:spPr>
+          <a:xfrm flipH="1">
+            <a:off x="7437120" y="3590925"/>
+            <a:ext cx="494665" cy="2459990"/>
+          </a:xfrm>
+          <a:prstGeom prst="line">
+            <a:avLst/>
+          </a:prstGeom>
+          <a:ln w="31750">
+            <a:gradFill>
+              <a:gsLst>
+                <a:gs pos="0">
+                  <a:schemeClr val="accent2">
+                    <a:hueOff val="-4200000"/>
+                  </a:schemeClr>
+                </a:gs>
+                <a:gs pos="100000">
+                  <a:schemeClr val="accent2"/>
+                </a:gs>
+              </a:gsLst>
+            </a:gradFill>
+          </a:ln>
+        </p:spPr>
+        <p:style>
+          <a:lnRef idx="0">
+            <a:srgbClr val="FFFFFF"/>
+          </a:lnRef>
+          <a:fillRef idx="0">
+            <a:srgbClr val="FFFFFF"/>
+          </a:fillRef>
+          <a:effectRef idx="0">
+            <a:srgbClr val="FFFFFF"/>
+          </a:effectRef>
+          <a:fontRef idx="minor">
+            <a:schemeClr val="tx1"/>
+          </a:fontRef>
+        </p:style>
+      </p:cxnSp>
+      <p:cxnSp>
+        <p:nvCxnSpPr>
+          <p:cNvPr id="9" name="直接连接符 8"/>
+          <p:cNvCxnSpPr/>
+          <p:nvPr/>
+        </p:nvCxnSpPr>
+        <p:spPr>
+          <a:xfrm flipH="1">
+            <a:off x="3030220" y="3590925"/>
+            <a:ext cx="494665" cy="2459990"/>
+          </a:xfrm>
+          <a:prstGeom prst="line">
+            <a:avLst/>
+          </a:prstGeom>
+          <a:ln w="31750">
+            <a:gradFill>
+              <a:gsLst>
+                <a:gs pos="0">
+                  <a:schemeClr val="accent2">
+                    <a:hueOff val="-4200000"/>
+                  </a:schemeClr>
+                </a:gs>
+                <a:gs pos="100000">
+                  <a:schemeClr val="accent2"/>
+                </a:gs>
+              </a:gsLst>
+            </a:gradFill>
+          </a:ln>
+        </p:spPr>
+        <p:style>
+          <a:lnRef idx="0">
+            <a:srgbClr val="FFFFFF"/>
+          </a:lnRef>
+          <a:fillRef idx="0">
+            <a:srgbClr val="FFFFFF"/>
+          </a:fillRef>
+          <a:effectRef idx="0">
+            <a:srgbClr val="FFFFFF"/>
+          </a:effectRef>
+          <a:fontRef idx="minor">
+            <a:schemeClr val="tx1"/>
+          </a:fontRef>
+        </p:style>
+      </p:cxnSp>
     </p:spTree>
   </p:cSld>
   <p:clrMapOvr>

</xml_diff>